<commit_message>
fixing latex errors and starting thesis contributons
</commit_message>
<xml_diff>
--- a/Thesis/introduction/figures/architecutre_diagram.pptx
+++ b/Thesis/introduction/figures/architecutre_diagram.pptx
@@ -208,7 +208,7 @@
           <a:p>
             <a:fld id="{263F11AE-B127-F14A-8E19-9C8C58404781}" type="datetimeFigureOut">
               <a:rPr lang="en-US" smtClean="0"/>
-              <a:t>5/4/15</a:t>
+              <a:t>5/5/15</a:t>
             </a:fld>
             <a:endParaRPr lang="en-US"/>
           </a:p>
@@ -741,7 +741,7 @@
           <a:p>
             <a:fld id="{544FCF9B-4D64-E146-AC3C-205DEAA733C4}" type="datetimeFigureOut">
               <a:rPr lang="en-US" smtClean="0"/>
-              <a:t>5/4/15</a:t>
+              <a:t>5/5/15</a:t>
             </a:fld>
             <a:endParaRPr lang="en-US"/>
           </a:p>
@@ -911,7 +911,7 @@
           <a:p>
             <a:fld id="{544FCF9B-4D64-E146-AC3C-205DEAA733C4}" type="datetimeFigureOut">
               <a:rPr lang="en-US" smtClean="0"/>
-              <a:t>5/4/15</a:t>
+              <a:t>5/5/15</a:t>
             </a:fld>
             <a:endParaRPr lang="en-US"/>
           </a:p>
@@ -1091,7 +1091,7 @@
           <a:p>
             <a:fld id="{544FCF9B-4D64-E146-AC3C-205DEAA733C4}" type="datetimeFigureOut">
               <a:rPr lang="en-US" smtClean="0"/>
-              <a:t>5/4/15</a:t>
+              <a:t>5/5/15</a:t>
             </a:fld>
             <a:endParaRPr lang="en-US"/>
           </a:p>
@@ -1261,7 +1261,7 @@
           <a:p>
             <a:fld id="{544FCF9B-4D64-E146-AC3C-205DEAA733C4}" type="datetimeFigureOut">
               <a:rPr lang="en-US" smtClean="0"/>
-              <a:t>5/4/15</a:t>
+              <a:t>5/5/15</a:t>
             </a:fld>
             <a:endParaRPr lang="en-US"/>
           </a:p>
@@ -1507,7 +1507,7 @@
           <a:p>
             <a:fld id="{544FCF9B-4D64-E146-AC3C-205DEAA733C4}" type="datetimeFigureOut">
               <a:rPr lang="en-US" smtClean="0"/>
-              <a:t>5/4/15</a:t>
+              <a:t>5/5/15</a:t>
             </a:fld>
             <a:endParaRPr lang="en-US"/>
           </a:p>
@@ -1795,7 +1795,7 @@
           <a:p>
             <a:fld id="{544FCF9B-4D64-E146-AC3C-205DEAA733C4}" type="datetimeFigureOut">
               <a:rPr lang="en-US" smtClean="0"/>
-              <a:t>5/4/15</a:t>
+              <a:t>5/5/15</a:t>
             </a:fld>
             <a:endParaRPr lang="en-US"/>
           </a:p>
@@ -2217,7 +2217,7 @@
           <a:p>
             <a:fld id="{544FCF9B-4D64-E146-AC3C-205DEAA733C4}" type="datetimeFigureOut">
               <a:rPr lang="en-US" smtClean="0"/>
-              <a:t>5/4/15</a:t>
+              <a:t>5/5/15</a:t>
             </a:fld>
             <a:endParaRPr lang="en-US"/>
           </a:p>
@@ -2335,7 +2335,7 @@
           <a:p>
             <a:fld id="{544FCF9B-4D64-E146-AC3C-205DEAA733C4}" type="datetimeFigureOut">
               <a:rPr lang="en-US" smtClean="0"/>
-              <a:t>5/4/15</a:t>
+              <a:t>5/5/15</a:t>
             </a:fld>
             <a:endParaRPr lang="en-US"/>
           </a:p>
@@ -2430,7 +2430,7 @@
           <a:p>
             <a:fld id="{544FCF9B-4D64-E146-AC3C-205DEAA733C4}" type="datetimeFigureOut">
               <a:rPr lang="en-US" smtClean="0"/>
-              <a:t>5/4/15</a:t>
+              <a:t>5/5/15</a:t>
             </a:fld>
             <a:endParaRPr lang="en-US"/>
           </a:p>
@@ -2707,7 +2707,7 @@
           <a:p>
             <a:fld id="{544FCF9B-4D64-E146-AC3C-205DEAA733C4}" type="datetimeFigureOut">
               <a:rPr lang="en-US" smtClean="0"/>
-              <a:t>5/4/15</a:t>
+              <a:t>5/5/15</a:t>
             </a:fld>
             <a:endParaRPr lang="en-US"/>
           </a:p>
@@ -2960,7 +2960,7 @@
           <a:p>
             <a:fld id="{544FCF9B-4D64-E146-AC3C-205DEAA733C4}" type="datetimeFigureOut">
               <a:rPr lang="en-US" smtClean="0"/>
-              <a:t>5/4/15</a:t>
+              <a:t>5/5/15</a:t>
             </a:fld>
             <a:endParaRPr lang="en-US"/>
           </a:p>
@@ -3173,7 +3173,7 @@
           <a:p>
             <a:fld id="{544FCF9B-4D64-E146-AC3C-205DEAA733C4}" type="datetimeFigureOut">
               <a:rPr lang="en-US" smtClean="0"/>
-              <a:t>5/4/15</a:t>
+              <a:t>5/5/15</a:t>
             </a:fld>
             <a:endParaRPr lang="en-US"/>
           </a:p>
@@ -5205,7 +5205,7 @@
           </p:nvSpPr>
           <p:spPr>
             <a:xfrm>
-              <a:off x="7042906" y="2904144"/>
+              <a:off x="7042906" y="2870006"/>
               <a:ext cx="912239" cy="162448"/>
             </a:xfrm>
             <a:prstGeom prst="rect">

</xml_diff>

<commit_message>
editing Alines comments in introduction [Thesis]
</commit_message>
<xml_diff>
--- a/Thesis/introduction/figures/architecutre_diagram.pptx
+++ b/Thesis/introduction/figures/architecutre_diagram.pptx
@@ -208,7 +208,7 @@
           <a:p>
             <a:fld id="{263F11AE-B127-F14A-8E19-9C8C58404781}" type="datetimeFigureOut">
               <a:rPr lang="en-US" smtClean="0"/>
-              <a:t>5/5/15</a:t>
+              <a:t>8/25/15</a:t>
             </a:fld>
             <a:endParaRPr lang="en-US"/>
           </a:p>
@@ -741,7 +741,7 @@
           <a:p>
             <a:fld id="{544FCF9B-4D64-E146-AC3C-205DEAA733C4}" type="datetimeFigureOut">
               <a:rPr lang="en-US" smtClean="0"/>
-              <a:t>5/5/15</a:t>
+              <a:t>8/25/15</a:t>
             </a:fld>
             <a:endParaRPr lang="en-US"/>
           </a:p>
@@ -911,7 +911,7 @@
           <a:p>
             <a:fld id="{544FCF9B-4D64-E146-AC3C-205DEAA733C4}" type="datetimeFigureOut">
               <a:rPr lang="en-US" smtClean="0"/>
-              <a:t>5/5/15</a:t>
+              <a:t>8/25/15</a:t>
             </a:fld>
             <a:endParaRPr lang="en-US"/>
           </a:p>
@@ -1091,7 +1091,7 @@
           <a:p>
             <a:fld id="{544FCF9B-4D64-E146-AC3C-205DEAA733C4}" type="datetimeFigureOut">
               <a:rPr lang="en-US" smtClean="0"/>
-              <a:t>5/5/15</a:t>
+              <a:t>8/25/15</a:t>
             </a:fld>
             <a:endParaRPr lang="en-US"/>
           </a:p>
@@ -1261,7 +1261,7 @@
           <a:p>
             <a:fld id="{544FCF9B-4D64-E146-AC3C-205DEAA733C4}" type="datetimeFigureOut">
               <a:rPr lang="en-US" smtClean="0"/>
-              <a:t>5/5/15</a:t>
+              <a:t>8/25/15</a:t>
             </a:fld>
             <a:endParaRPr lang="en-US"/>
           </a:p>
@@ -1507,7 +1507,7 @@
           <a:p>
             <a:fld id="{544FCF9B-4D64-E146-AC3C-205DEAA733C4}" type="datetimeFigureOut">
               <a:rPr lang="en-US" smtClean="0"/>
-              <a:t>5/5/15</a:t>
+              <a:t>8/25/15</a:t>
             </a:fld>
             <a:endParaRPr lang="en-US"/>
           </a:p>
@@ -1795,7 +1795,7 @@
           <a:p>
             <a:fld id="{544FCF9B-4D64-E146-AC3C-205DEAA733C4}" type="datetimeFigureOut">
               <a:rPr lang="en-US" smtClean="0"/>
-              <a:t>5/5/15</a:t>
+              <a:t>8/25/15</a:t>
             </a:fld>
             <a:endParaRPr lang="en-US"/>
           </a:p>
@@ -2217,7 +2217,7 @@
           <a:p>
             <a:fld id="{544FCF9B-4D64-E146-AC3C-205DEAA733C4}" type="datetimeFigureOut">
               <a:rPr lang="en-US" smtClean="0"/>
-              <a:t>5/5/15</a:t>
+              <a:t>8/25/15</a:t>
             </a:fld>
             <a:endParaRPr lang="en-US"/>
           </a:p>
@@ -2335,7 +2335,7 @@
           <a:p>
             <a:fld id="{544FCF9B-4D64-E146-AC3C-205DEAA733C4}" type="datetimeFigureOut">
               <a:rPr lang="en-US" smtClean="0"/>
-              <a:t>5/5/15</a:t>
+              <a:t>8/25/15</a:t>
             </a:fld>
             <a:endParaRPr lang="en-US"/>
           </a:p>
@@ -2430,7 +2430,7 @@
           <a:p>
             <a:fld id="{544FCF9B-4D64-E146-AC3C-205DEAA733C4}" type="datetimeFigureOut">
               <a:rPr lang="en-US" smtClean="0"/>
-              <a:t>5/5/15</a:t>
+              <a:t>8/25/15</a:t>
             </a:fld>
             <a:endParaRPr lang="en-US"/>
           </a:p>
@@ -2707,7 +2707,7 @@
           <a:p>
             <a:fld id="{544FCF9B-4D64-E146-AC3C-205DEAA733C4}" type="datetimeFigureOut">
               <a:rPr lang="en-US" smtClean="0"/>
-              <a:t>5/5/15</a:t>
+              <a:t>8/25/15</a:t>
             </a:fld>
             <a:endParaRPr lang="en-US"/>
           </a:p>
@@ -2960,7 +2960,7 @@
           <a:p>
             <a:fld id="{544FCF9B-4D64-E146-AC3C-205DEAA733C4}" type="datetimeFigureOut">
               <a:rPr lang="en-US" smtClean="0"/>
-              <a:t>5/5/15</a:t>
+              <a:t>8/25/15</a:t>
             </a:fld>
             <a:endParaRPr lang="en-US"/>
           </a:p>
@@ -3173,7 +3173,7 @@
           <a:p>
             <a:fld id="{544FCF9B-4D64-E146-AC3C-205DEAA733C4}" type="datetimeFigureOut">
               <a:rPr lang="en-US" smtClean="0"/>
-              <a:t>5/5/15</a:t>
+              <a:t>8/25/15</a:t>
             </a:fld>
             <a:endParaRPr lang="en-US"/>
           </a:p>
@@ -5110,8 +5110,8 @@
         </p:nvSpPr>
         <p:spPr>
           <a:xfrm>
-            <a:off x="6664577" y="533327"/>
-            <a:ext cx="1612196" cy="261610"/>
+            <a:off x="6664577" y="475136"/>
+            <a:ext cx="1612196" cy="430887"/>
           </a:xfrm>
           <a:prstGeom prst="rect">
             <a:avLst/>
@@ -5129,8 +5129,12 @@
           <a:p>
             <a:pPr algn="ctr"/>
             <a:r>
-              <a:rPr lang="en-US" sz="1100" dirty="0" smtClean="0"/>
-              <a:t>Semantic Enricher</a:t>
+              <a:rPr lang="en-US" sz="1100" smtClean="0"/>
+              <a:t>Semantic </a:t>
+            </a:r>
+            <a:r>
+              <a:rPr lang="en-US" sz="1100" smtClean="0"/>
+              <a:t>Enricher (RUBIX)</a:t>
             </a:r>
             <a:endParaRPr lang="en-US" sz="1100" dirty="0"/>
           </a:p>
@@ -5483,7 +5487,15 @@
               <a:pPr algn="ctr"/>
               <a:r>
                 <a:rPr lang="en-US" sz="1100" dirty="0" smtClean="0"/>
-                <a:t>Harmonized Dataset Model</a:t>
+                <a:t>Harmonized </a:t>
+              </a:r>
+              <a:r>
+                <a:rPr lang="en-US" sz="1100" smtClean="0"/>
+                <a:t>Dataset </a:t>
+              </a:r>
+              <a:r>
+                <a:rPr lang="en-US" sz="1100" smtClean="0"/>
+                <a:t>Model (HDL)</a:t>
               </a:r>
               <a:endParaRPr lang="en-US" sz="1100" dirty="0"/>
             </a:p>
@@ -5563,7 +5575,11 @@
             <a:pPr algn="ctr"/>
             <a:r>
               <a:rPr lang="en-US" sz="1100" dirty="0" smtClean="0"/>
-              <a:t>Semantic Social News Aggregator</a:t>
+              <a:t>Semantic Social News </a:t>
+            </a:r>
+            <a:r>
+              <a:rPr lang="en-US" sz="1100" dirty="0" smtClean="0"/>
+              <a:t>Aggregator (SNARC)</a:t>
             </a:r>
             <a:endParaRPr lang="en-US" sz="1100" dirty="0"/>
           </a:p>
@@ -6543,6 +6559,82 @@
           </p:txBody>
         </p:sp>
       </p:grpSp>
+      <p:sp>
+        <p:nvSpPr>
+          <p:cNvPr id="2" name="Rectangle 1"/>
+          <p:cNvSpPr/>
+          <p:nvPr/>
+        </p:nvSpPr>
+        <p:spPr>
+          <a:xfrm>
+            <a:off x="290945" y="282633"/>
+            <a:ext cx="6203109" cy="3125585"/>
+          </a:xfrm>
+          <a:prstGeom prst="rect">
+            <a:avLst/>
+          </a:prstGeom>
+          <a:noFill/>
+          <a:ln w="6350">
+            <a:prstDash val="sysDash"/>
+          </a:ln>
+        </p:spPr>
+        <p:style>
+          <a:lnRef idx="2">
+            <a:schemeClr val="dk1"/>
+          </a:lnRef>
+          <a:fillRef idx="1">
+            <a:schemeClr val="lt1"/>
+          </a:fillRef>
+          <a:effectRef idx="0">
+            <a:schemeClr val="dk1"/>
+          </a:effectRef>
+          <a:fontRef idx="minor">
+            <a:schemeClr val="dk1"/>
+          </a:fontRef>
+        </p:style>
+        <p:txBody>
+          <a:bodyPr rtlCol="0" anchor="ctr"/>
+          <a:lstStyle/>
+          <a:p>
+            <a:pPr algn="ctr"/>
+            <a:endParaRPr lang="en-US"/>
+          </a:p>
+        </p:txBody>
+      </p:sp>
+      <p:sp>
+        <p:nvSpPr>
+          <p:cNvPr id="88" name="TextBox 87"/>
+          <p:cNvSpPr txBox="1"/>
+          <p:nvPr/>
+        </p:nvSpPr>
+        <p:spPr>
+          <a:xfrm>
+            <a:off x="-183868" y="243890"/>
+            <a:ext cx="1612196" cy="261610"/>
+          </a:xfrm>
+          <a:prstGeom prst="rect">
+            <a:avLst/>
+          </a:prstGeom>
+          <a:noFill/>
+          <a:ln>
+            <a:noFill/>
+          </a:ln>
+        </p:spPr>
+        <p:txBody>
+          <a:bodyPr wrap="square" rtlCol="0">
+            <a:spAutoFit/>
+          </a:bodyPr>
+          <a:lstStyle/>
+          <a:p>
+            <a:pPr algn="ctr"/>
+            <a:r>
+              <a:rPr lang="en-US" sz="1100" smtClean="0"/>
+              <a:t>Roomba</a:t>
+            </a:r>
+            <a:endParaRPr lang="en-US" sz="1100" dirty="0"/>
+          </a:p>
+        </p:txBody>
+      </p:sp>
     </p:spTree>
     <p:extLst>
       <p:ext uri="{BB962C8B-B14F-4D97-AF65-F5344CB8AC3E}">

</xml_diff>

<commit_message>
editing chapter 1 in part 1 with Alines comments [Thesis]
</commit_message>
<xml_diff>
--- a/Thesis/introduction/figures/architecutre_diagram.pptx
+++ b/Thesis/introduction/figures/architecutre_diagram.pptx
@@ -208,7 +208,7 @@
           <a:p>
             <a:fld id="{263F11AE-B127-F14A-8E19-9C8C58404781}" type="datetimeFigureOut">
               <a:rPr lang="en-US" smtClean="0"/>
-              <a:t>8/25/15</a:t>
+              <a:t>9/8/15</a:t>
             </a:fld>
             <a:endParaRPr lang="en-US"/>
           </a:p>
@@ -741,7 +741,7 @@
           <a:p>
             <a:fld id="{544FCF9B-4D64-E146-AC3C-205DEAA733C4}" type="datetimeFigureOut">
               <a:rPr lang="en-US" smtClean="0"/>
-              <a:t>8/25/15</a:t>
+              <a:t>9/8/15</a:t>
             </a:fld>
             <a:endParaRPr lang="en-US"/>
           </a:p>
@@ -911,7 +911,7 @@
           <a:p>
             <a:fld id="{544FCF9B-4D64-E146-AC3C-205DEAA733C4}" type="datetimeFigureOut">
               <a:rPr lang="en-US" smtClean="0"/>
-              <a:t>8/25/15</a:t>
+              <a:t>9/8/15</a:t>
             </a:fld>
             <a:endParaRPr lang="en-US"/>
           </a:p>
@@ -1091,7 +1091,7 @@
           <a:p>
             <a:fld id="{544FCF9B-4D64-E146-AC3C-205DEAA733C4}" type="datetimeFigureOut">
               <a:rPr lang="en-US" smtClean="0"/>
-              <a:t>8/25/15</a:t>
+              <a:t>9/8/15</a:t>
             </a:fld>
             <a:endParaRPr lang="en-US"/>
           </a:p>
@@ -1261,7 +1261,7 @@
           <a:p>
             <a:fld id="{544FCF9B-4D64-E146-AC3C-205DEAA733C4}" type="datetimeFigureOut">
               <a:rPr lang="en-US" smtClean="0"/>
-              <a:t>8/25/15</a:t>
+              <a:t>9/8/15</a:t>
             </a:fld>
             <a:endParaRPr lang="en-US"/>
           </a:p>
@@ -1507,7 +1507,7 @@
           <a:p>
             <a:fld id="{544FCF9B-4D64-E146-AC3C-205DEAA733C4}" type="datetimeFigureOut">
               <a:rPr lang="en-US" smtClean="0"/>
-              <a:t>8/25/15</a:t>
+              <a:t>9/8/15</a:t>
             </a:fld>
             <a:endParaRPr lang="en-US"/>
           </a:p>
@@ -1795,7 +1795,7 @@
           <a:p>
             <a:fld id="{544FCF9B-4D64-E146-AC3C-205DEAA733C4}" type="datetimeFigureOut">
               <a:rPr lang="en-US" smtClean="0"/>
-              <a:t>8/25/15</a:t>
+              <a:t>9/8/15</a:t>
             </a:fld>
             <a:endParaRPr lang="en-US"/>
           </a:p>
@@ -2217,7 +2217,7 @@
           <a:p>
             <a:fld id="{544FCF9B-4D64-E146-AC3C-205DEAA733C4}" type="datetimeFigureOut">
               <a:rPr lang="en-US" smtClean="0"/>
-              <a:t>8/25/15</a:t>
+              <a:t>9/8/15</a:t>
             </a:fld>
             <a:endParaRPr lang="en-US"/>
           </a:p>
@@ -2335,7 +2335,7 @@
           <a:p>
             <a:fld id="{544FCF9B-4D64-E146-AC3C-205DEAA733C4}" type="datetimeFigureOut">
               <a:rPr lang="en-US" smtClean="0"/>
-              <a:t>8/25/15</a:t>
+              <a:t>9/8/15</a:t>
             </a:fld>
             <a:endParaRPr lang="en-US"/>
           </a:p>
@@ -2430,7 +2430,7 @@
           <a:p>
             <a:fld id="{544FCF9B-4D64-E146-AC3C-205DEAA733C4}" type="datetimeFigureOut">
               <a:rPr lang="en-US" smtClean="0"/>
-              <a:t>8/25/15</a:t>
+              <a:t>9/8/15</a:t>
             </a:fld>
             <a:endParaRPr lang="en-US"/>
           </a:p>
@@ -2707,7 +2707,7 @@
           <a:p>
             <a:fld id="{544FCF9B-4D64-E146-AC3C-205DEAA733C4}" type="datetimeFigureOut">
               <a:rPr lang="en-US" smtClean="0"/>
-              <a:t>8/25/15</a:t>
+              <a:t>9/8/15</a:t>
             </a:fld>
             <a:endParaRPr lang="en-US"/>
           </a:p>
@@ -2960,7 +2960,7 @@
           <a:p>
             <a:fld id="{544FCF9B-4D64-E146-AC3C-205DEAA733C4}" type="datetimeFigureOut">
               <a:rPr lang="en-US" smtClean="0"/>
-              <a:t>8/25/15</a:t>
+              <a:t>9/8/15</a:t>
             </a:fld>
             <a:endParaRPr lang="en-US"/>
           </a:p>
@@ -3173,7 +3173,7 @@
           <a:p>
             <a:fld id="{544FCF9B-4D64-E146-AC3C-205DEAA733C4}" type="datetimeFigureOut">
               <a:rPr lang="en-US" smtClean="0"/>
-              <a:t>8/25/15</a:t>
+              <a:t>9/8/15</a:t>
             </a:fld>
             <a:endParaRPr lang="en-US"/>
           </a:p>
@@ -5130,11 +5130,7 @@
             <a:pPr algn="ctr"/>
             <a:r>
               <a:rPr lang="en-US" sz="1100" smtClean="0"/>
-              <a:t>Semantic </a:t>
-            </a:r>
-            <a:r>
-              <a:rPr lang="en-US" sz="1100" smtClean="0"/>
-              <a:t>Enricher (RUBIX)</a:t>
+              <a:t>Semantic Enricher (RUBIX)</a:t>
             </a:r>
             <a:endParaRPr lang="en-US" sz="1100" dirty="0"/>
           </a:p>
@@ -5491,11 +5487,7 @@
               </a:r>
               <a:r>
                 <a:rPr lang="en-US" sz="1100" smtClean="0"/>
-                <a:t>Dataset </a:t>
-              </a:r>
-              <a:r>
-                <a:rPr lang="en-US" sz="1100" smtClean="0"/>
-                <a:t>Model (HDL)</a:t>
+                <a:t>Dataset Model (HDL)</a:t>
               </a:r>
               <a:endParaRPr lang="en-US" sz="1100" dirty="0"/>
             </a:p>
@@ -5575,11 +5567,7 @@
             <a:pPr algn="ctr"/>
             <a:r>
               <a:rPr lang="en-US" sz="1100" dirty="0" smtClean="0"/>
-              <a:t>Semantic Social News </a:t>
-            </a:r>
-            <a:r>
-              <a:rPr lang="en-US" sz="1100" dirty="0" smtClean="0"/>
-              <a:t>Aggregator (SNARC)</a:t>
+              <a:t>Semantic Social News Aggregator (SNARC)</a:t>
             </a:r>
             <a:endParaRPr lang="en-US" sz="1100" dirty="0"/>
           </a:p>
@@ -6567,8 +6555,8 @@
         </p:nvSpPr>
         <p:spPr>
           <a:xfrm>
-            <a:off x="290945" y="282633"/>
-            <a:ext cx="6203109" cy="3125585"/>
+            <a:off x="290945" y="240847"/>
+            <a:ext cx="6203109" cy="3167371"/>
           </a:xfrm>
           <a:prstGeom prst="rect">
             <a:avLst/>
@@ -6609,7 +6597,7 @@
         </p:nvSpPr>
         <p:spPr>
           <a:xfrm>
-            <a:off x="-183868" y="243890"/>
+            <a:off x="-61681" y="221354"/>
             <a:ext cx="1612196" cy="261610"/>
           </a:xfrm>
           <a:prstGeom prst="rect">
@@ -6635,6 +6623,491 @@
           </a:p>
         </p:txBody>
       </p:sp>
+      <p:grpSp>
+        <p:nvGrpSpPr>
+          <p:cNvPr id="13" name="Group 12"/>
+          <p:cNvGrpSpPr/>
+          <p:nvPr/>
+        </p:nvGrpSpPr>
+        <p:grpSpPr>
+          <a:xfrm>
+            <a:off x="271275" y="218545"/>
+            <a:ext cx="227096" cy="264653"/>
+            <a:chOff x="-776977" y="923541"/>
+            <a:chExt cx="244748" cy="276999"/>
+          </a:xfrm>
+        </p:grpSpPr>
+        <p:sp>
+          <p:nvSpPr>
+            <p:cNvPr id="11" name="Rectangle 10"/>
+            <p:cNvSpPr/>
+            <p:nvPr/>
+          </p:nvSpPr>
+          <p:spPr>
+            <a:xfrm>
+              <a:off x="-732373" y="977331"/>
+              <a:ext cx="180827" cy="165574"/>
+            </a:xfrm>
+            <a:prstGeom prst="rect">
+              <a:avLst/>
+            </a:prstGeom>
+            <a:solidFill>
+              <a:schemeClr val="tx1"/>
+            </a:solidFill>
+            <a:ln>
+              <a:noFill/>
+            </a:ln>
+            <a:effectLst/>
+          </p:spPr>
+          <p:style>
+            <a:lnRef idx="1">
+              <a:schemeClr val="accent1"/>
+            </a:lnRef>
+            <a:fillRef idx="3">
+              <a:schemeClr val="accent1"/>
+            </a:fillRef>
+            <a:effectRef idx="2">
+              <a:schemeClr val="accent1"/>
+            </a:effectRef>
+            <a:fontRef idx="minor">
+              <a:schemeClr val="lt1"/>
+            </a:fontRef>
+          </p:style>
+          <p:txBody>
+            <a:bodyPr rtlCol="0" anchor="ctr"/>
+            <a:lstStyle/>
+            <a:p>
+              <a:pPr algn="ctr"/>
+              <a:endParaRPr lang="en-US"/>
+            </a:p>
+          </p:txBody>
+        </p:sp>
+        <p:sp>
+          <p:nvSpPr>
+            <p:cNvPr id="4" name="TextBox 3"/>
+            <p:cNvSpPr txBox="1"/>
+            <p:nvPr/>
+          </p:nvSpPr>
+          <p:spPr>
+            <a:xfrm>
+              <a:off x="-776977" y="923541"/>
+              <a:ext cx="244748" cy="276999"/>
+            </a:xfrm>
+            <a:prstGeom prst="rect">
+              <a:avLst/>
+            </a:prstGeom>
+            <a:noFill/>
+          </p:spPr>
+          <p:txBody>
+            <a:bodyPr wrap="square" rtlCol="0">
+              <a:spAutoFit/>
+            </a:bodyPr>
+            <a:lstStyle/>
+            <a:p>
+              <a:r>
+                <a:rPr lang="en-US" sz="1200" dirty="0" smtClean="0">
+                  <a:solidFill>
+                    <a:schemeClr val="bg1"/>
+                  </a:solidFill>
+                </a:rPr>
+                <a:t>A</a:t>
+              </a:r>
+              <a:endParaRPr lang="en-US" sz="1200" dirty="0">
+                <a:solidFill>
+                  <a:schemeClr val="bg1"/>
+                </a:solidFill>
+              </a:endParaRPr>
+            </a:p>
+          </p:txBody>
+        </p:sp>
+      </p:grpSp>
+      <p:grpSp>
+        <p:nvGrpSpPr>
+          <p:cNvPr id="90" name="Group 89"/>
+          <p:cNvGrpSpPr/>
+          <p:nvPr/>
+        </p:nvGrpSpPr>
+        <p:grpSpPr>
+          <a:xfrm>
+            <a:off x="384823" y="3547689"/>
+            <a:ext cx="227096" cy="276999"/>
+            <a:chOff x="-776977" y="923541"/>
+            <a:chExt cx="244748" cy="289921"/>
+          </a:xfrm>
+        </p:grpSpPr>
+        <p:sp>
+          <p:nvSpPr>
+            <p:cNvPr id="91" name="Rectangle 90"/>
+            <p:cNvSpPr/>
+            <p:nvPr/>
+          </p:nvSpPr>
+          <p:spPr>
+            <a:xfrm>
+              <a:off x="-732373" y="977331"/>
+              <a:ext cx="180827" cy="165574"/>
+            </a:xfrm>
+            <a:prstGeom prst="rect">
+              <a:avLst/>
+            </a:prstGeom>
+            <a:solidFill>
+              <a:schemeClr val="tx1"/>
+            </a:solidFill>
+            <a:ln>
+              <a:noFill/>
+            </a:ln>
+            <a:effectLst/>
+          </p:spPr>
+          <p:style>
+            <a:lnRef idx="1">
+              <a:schemeClr val="accent1"/>
+            </a:lnRef>
+            <a:fillRef idx="3">
+              <a:schemeClr val="accent1"/>
+            </a:fillRef>
+            <a:effectRef idx="2">
+              <a:schemeClr val="accent1"/>
+            </a:effectRef>
+            <a:fontRef idx="minor">
+              <a:schemeClr val="lt1"/>
+            </a:fontRef>
+          </p:style>
+          <p:txBody>
+            <a:bodyPr rtlCol="0" anchor="ctr"/>
+            <a:lstStyle/>
+            <a:p>
+              <a:pPr algn="ctr"/>
+              <a:endParaRPr lang="en-US"/>
+            </a:p>
+          </p:txBody>
+        </p:sp>
+        <p:sp>
+          <p:nvSpPr>
+            <p:cNvPr id="93" name="TextBox 92"/>
+            <p:cNvSpPr txBox="1"/>
+            <p:nvPr/>
+          </p:nvSpPr>
+          <p:spPr>
+            <a:xfrm>
+              <a:off x="-776977" y="923541"/>
+              <a:ext cx="244748" cy="289921"/>
+            </a:xfrm>
+            <a:prstGeom prst="rect">
+              <a:avLst/>
+            </a:prstGeom>
+            <a:noFill/>
+          </p:spPr>
+          <p:txBody>
+            <a:bodyPr wrap="square" rtlCol="0">
+              <a:spAutoFit/>
+            </a:bodyPr>
+            <a:lstStyle/>
+            <a:p>
+              <a:r>
+                <a:rPr lang="en-US" sz="1200" dirty="0">
+                  <a:solidFill>
+                    <a:schemeClr val="bg1"/>
+                  </a:solidFill>
+                </a:rPr>
+                <a:t>B</a:t>
+              </a:r>
+            </a:p>
+          </p:txBody>
+        </p:sp>
+      </p:grpSp>
+      <p:grpSp>
+        <p:nvGrpSpPr>
+          <p:cNvPr id="94" name="Group 93"/>
+          <p:cNvGrpSpPr/>
+          <p:nvPr/>
+        </p:nvGrpSpPr>
+        <p:grpSpPr>
+          <a:xfrm>
+            <a:off x="2368557" y="2094886"/>
+            <a:ext cx="227096" cy="276999"/>
+            <a:chOff x="-776977" y="923541"/>
+            <a:chExt cx="244748" cy="289921"/>
+          </a:xfrm>
+        </p:grpSpPr>
+        <p:sp>
+          <p:nvSpPr>
+            <p:cNvPr id="95" name="Rectangle 94"/>
+            <p:cNvSpPr/>
+            <p:nvPr/>
+          </p:nvSpPr>
+          <p:spPr>
+            <a:xfrm>
+              <a:off x="-732373" y="977331"/>
+              <a:ext cx="180827" cy="165574"/>
+            </a:xfrm>
+            <a:prstGeom prst="rect">
+              <a:avLst/>
+            </a:prstGeom>
+            <a:solidFill>
+              <a:schemeClr val="tx1"/>
+            </a:solidFill>
+            <a:ln>
+              <a:noFill/>
+            </a:ln>
+            <a:effectLst/>
+          </p:spPr>
+          <p:style>
+            <a:lnRef idx="1">
+              <a:schemeClr val="accent1"/>
+            </a:lnRef>
+            <a:fillRef idx="3">
+              <a:schemeClr val="accent1"/>
+            </a:fillRef>
+            <a:effectRef idx="2">
+              <a:schemeClr val="accent1"/>
+            </a:effectRef>
+            <a:fontRef idx="minor">
+              <a:schemeClr val="lt1"/>
+            </a:fontRef>
+          </p:style>
+          <p:txBody>
+            <a:bodyPr rtlCol="0" anchor="ctr"/>
+            <a:lstStyle/>
+            <a:p>
+              <a:pPr algn="ctr"/>
+              <a:endParaRPr lang="en-US"/>
+            </a:p>
+          </p:txBody>
+        </p:sp>
+        <p:sp>
+          <p:nvSpPr>
+            <p:cNvPr id="96" name="TextBox 95"/>
+            <p:cNvSpPr txBox="1"/>
+            <p:nvPr/>
+          </p:nvSpPr>
+          <p:spPr>
+            <a:xfrm>
+              <a:off x="-776977" y="923541"/>
+              <a:ext cx="244748" cy="289921"/>
+            </a:xfrm>
+            <a:prstGeom prst="rect">
+              <a:avLst/>
+            </a:prstGeom>
+            <a:noFill/>
+          </p:spPr>
+          <p:txBody>
+            <a:bodyPr wrap="square" rtlCol="0">
+              <a:spAutoFit/>
+            </a:bodyPr>
+            <a:lstStyle/>
+            <a:p>
+              <a:r>
+                <a:rPr lang="en-US" sz="1200" dirty="0">
+                  <a:solidFill>
+                    <a:schemeClr val="bg1"/>
+                  </a:solidFill>
+                </a:rPr>
+                <a:t>C</a:t>
+              </a:r>
+              <a:endParaRPr lang="en-US" sz="1200" dirty="0">
+                <a:solidFill>
+                  <a:schemeClr val="bg1"/>
+                </a:solidFill>
+              </a:endParaRPr>
+            </a:p>
+          </p:txBody>
+        </p:sp>
+      </p:grpSp>
+      <p:grpSp>
+        <p:nvGrpSpPr>
+          <p:cNvPr id="97" name="Group 96"/>
+          <p:cNvGrpSpPr/>
+          <p:nvPr/>
+        </p:nvGrpSpPr>
+        <p:grpSpPr>
+          <a:xfrm>
+            <a:off x="6569341" y="453950"/>
+            <a:ext cx="227096" cy="276999"/>
+            <a:chOff x="-776977" y="923541"/>
+            <a:chExt cx="244748" cy="289921"/>
+          </a:xfrm>
+        </p:grpSpPr>
+        <p:sp>
+          <p:nvSpPr>
+            <p:cNvPr id="98" name="Rectangle 97"/>
+            <p:cNvSpPr/>
+            <p:nvPr/>
+          </p:nvSpPr>
+          <p:spPr>
+            <a:xfrm>
+              <a:off x="-732373" y="977331"/>
+              <a:ext cx="180827" cy="165574"/>
+            </a:xfrm>
+            <a:prstGeom prst="rect">
+              <a:avLst/>
+            </a:prstGeom>
+            <a:solidFill>
+              <a:schemeClr val="tx1"/>
+            </a:solidFill>
+            <a:ln>
+              <a:noFill/>
+            </a:ln>
+            <a:effectLst/>
+          </p:spPr>
+          <p:style>
+            <a:lnRef idx="1">
+              <a:schemeClr val="accent1"/>
+            </a:lnRef>
+            <a:fillRef idx="3">
+              <a:schemeClr val="accent1"/>
+            </a:fillRef>
+            <a:effectRef idx="2">
+              <a:schemeClr val="accent1"/>
+            </a:effectRef>
+            <a:fontRef idx="minor">
+              <a:schemeClr val="lt1"/>
+            </a:fontRef>
+          </p:style>
+          <p:txBody>
+            <a:bodyPr rtlCol="0" anchor="ctr"/>
+            <a:lstStyle/>
+            <a:p>
+              <a:pPr algn="ctr"/>
+              <a:endParaRPr lang="en-US"/>
+            </a:p>
+          </p:txBody>
+        </p:sp>
+        <p:sp>
+          <p:nvSpPr>
+            <p:cNvPr id="99" name="TextBox 98"/>
+            <p:cNvSpPr txBox="1"/>
+            <p:nvPr/>
+          </p:nvSpPr>
+          <p:spPr>
+            <a:xfrm>
+              <a:off x="-776977" y="923541"/>
+              <a:ext cx="244748" cy="289921"/>
+            </a:xfrm>
+            <a:prstGeom prst="rect">
+              <a:avLst/>
+            </a:prstGeom>
+            <a:noFill/>
+          </p:spPr>
+          <p:txBody>
+            <a:bodyPr wrap="square" rtlCol="0">
+              <a:spAutoFit/>
+            </a:bodyPr>
+            <a:lstStyle/>
+            <a:p>
+              <a:r>
+                <a:rPr lang="en-US" sz="1200" dirty="0">
+                  <a:solidFill>
+                    <a:schemeClr val="bg1"/>
+                  </a:solidFill>
+                </a:rPr>
+                <a:t>D</a:t>
+              </a:r>
+              <a:endParaRPr lang="en-US" sz="1200" dirty="0">
+                <a:solidFill>
+                  <a:schemeClr val="bg1"/>
+                </a:solidFill>
+              </a:endParaRPr>
+            </a:p>
+          </p:txBody>
+        </p:sp>
+      </p:grpSp>
+      <p:grpSp>
+        <p:nvGrpSpPr>
+          <p:cNvPr id="100" name="Group 99"/>
+          <p:cNvGrpSpPr/>
+          <p:nvPr/>
+        </p:nvGrpSpPr>
+        <p:grpSpPr>
+          <a:xfrm>
+            <a:off x="384823" y="3932665"/>
+            <a:ext cx="227096" cy="461665"/>
+            <a:chOff x="-776977" y="923541"/>
+            <a:chExt cx="244748" cy="483202"/>
+          </a:xfrm>
+        </p:grpSpPr>
+        <p:sp>
+          <p:nvSpPr>
+            <p:cNvPr id="101" name="Rectangle 100"/>
+            <p:cNvSpPr/>
+            <p:nvPr/>
+          </p:nvSpPr>
+          <p:spPr>
+            <a:xfrm>
+              <a:off x="-732373" y="977331"/>
+              <a:ext cx="180827" cy="165574"/>
+            </a:xfrm>
+            <a:prstGeom prst="rect">
+              <a:avLst/>
+            </a:prstGeom>
+            <a:solidFill>
+              <a:schemeClr val="tx1"/>
+            </a:solidFill>
+            <a:ln>
+              <a:noFill/>
+            </a:ln>
+            <a:effectLst/>
+          </p:spPr>
+          <p:style>
+            <a:lnRef idx="1">
+              <a:schemeClr val="accent1"/>
+            </a:lnRef>
+            <a:fillRef idx="3">
+              <a:schemeClr val="accent1"/>
+            </a:fillRef>
+            <a:effectRef idx="2">
+              <a:schemeClr val="accent1"/>
+            </a:effectRef>
+            <a:fontRef idx="minor">
+              <a:schemeClr val="lt1"/>
+            </a:fontRef>
+          </p:style>
+          <p:txBody>
+            <a:bodyPr rtlCol="0" anchor="ctr"/>
+            <a:lstStyle/>
+            <a:p>
+              <a:pPr algn="ctr"/>
+              <a:endParaRPr lang="en-US"/>
+            </a:p>
+          </p:txBody>
+        </p:sp>
+        <p:sp>
+          <p:nvSpPr>
+            <p:cNvPr id="102" name="TextBox 101"/>
+            <p:cNvSpPr txBox="1"/>
+            <p:nvPr/>
+          </p:nvSpPr>
+          <p:spPr>
+            <a:xfrm>
+              <a:off x="-776977" y="923541"/>
+              <a:ext cx="244748" cy="483202"/>
+            </a:xfrm>
+            <a:prstGeom prst="rect">
+              <a:avLst/>
+            </a:prstGeom>
+            <a:noFill/>
+          </p:spPr>
+          <p:txBody>
+            <a:bodyPr wrap="square" rtlCol="0">
+              <a:spAutoFit/>
+            </a:bodyPr>
+            <a:lstStyle/>
+            <a:p>
+              <a:r>
+                <a:rPr lang="en-US" sz="1200" dirty="0" smtClean="0">
+                  <a:solidFill>
+                    <a:schemeClr val="bg1"/>
+                  </a:solidFill>
+                </a:rPr>
+                <a:t>EA</a:t>
+              </a:r>
+              <a:endParaRPr lang="en-US" sz="1200" dirty="0">
+                <a:solidFill>
+                  <a:schemeClr val="bg1"/>
+                </a:solidFill>
+              </a:endParaRPr>
+            </a:p>
+          </p:txBody>
+        </p:sp>
+      </p:grpSp>
     </p:spTree>
     <p:extLst>
       <p:ext uri="{BB962C8B-B14F-4D97-AF65-F5344CB8AC3E}">

</xml_diff>

<commit_message>
adding conclusion and fixing architectural diagrams [Thesis]
</commit_message>
<xml_diff>
--- a/Thesis/introduction/figures/architecutre_diagram.pptx
+++ b/Thesis/introduction/figures/architecutre_diagram.pptx
@@ -208,7 +208,7 @@
           <a:p>
             <a:fld id="{263F11AE-B127-F14A-8E19-9C8C58404781}" type="datetimeFigureOut">
               <a:rPr lang="en-US" smtClean="0"/>
-              <a:t>9/8/15</a:t>
+              <a:t>9/10/15</a:t>
             </a:fld>
             <a:endParaRPr lang="en-US"/>
           </a:p>
@@ -741,7 +741,7 @@
           <a:p>
             <a:fld id="{544FCF9B-4D64-E146-AC3C-205DEAA733C4}" type="datetimeFigureOut">
               <a:rPr lang="en-US" smtClean="0"/>
-              <a:t>9/8/15</a:t>
+              <a:t>9/10/15</a:t>
             </a:fld>
             <a:endParaRPr lang="en-US"/>
           </a:p>
@@ -911,7 +911,7 @@
           <a:p>
             <a:fld id="{544FCF9B-4D64-E146-AC3C-205DEAA733C4}" type="datetimeFigureOut">
               <a:rPr lang="en-US" smtClean="0"/>
-              <a:t>9/8/15</a:t>
+              <a:t>9/10/15</a:t>
             </a:fld>
             <a:endParaRPr lang="en-US"/>
           </a:p>
@@ -1091,7 +1091,7 @@
           <a:p>
             <a:fld id="{544FCF9B-4D64-E146-AC3C-205DEAA733C4}" type="datetimeFigureOut">
               <a:rPr lang="en-US" smtClean="0"/>
-              <a:t>9/8/15</a:t>
+              <a:t>9/10/15</a:t>
             </a:fld>
             <a:endParaRPr lang="en-US"/>
           </a:p>
@@ -1261,7 +1261,7 @@
           <a:p>
             <a:fld id="{544FCF9B-4D64-E146-AC3C-205DEAA733C4}" type="datetimeFigureOut">
               <a:rPr lang="en-US" smtClean="0"/>
-              <a:t>9/8/15</a:t>
+              <a:t>9/10/15</a:t>
             </a:fld>
             <a:endParaRPr lang="en-US"/>
           </a:p>
@@ -1507,7 +1507,7 @@
           <a:p>
             <a:fld id="{544FCF9B-4D64-E146-AC3C-205DEAA733C4}" type="datetimeFigureOut">
               <a:rPr lang="en-US" smtClean="0"/>
-              <a:t>9/8/15</a:t>
+              <a:t>9/10/15</a:t>
             </a:fld>
             <a:endParaRPr lang="en-US"/>
           </a:p>
@@ -1795,7 +1795,7 @@
           <a:p>
             <a:fld id="{544FCF9B-4D64-E146-AC3C-205DEAA733C4}" type="datetimeFigureOut">
               <a:rPr lang="en-US" smtClean="0"/>
-              <a:t>9/8/15</a:t>
+              <a:t>9/10/15</a:t>
             </a:fld>
             <a:endParaRPr lang="en-US"/>
           </a:p>
@@ -2217,7 +2217,7 @@
           <a:p>
             <a:fld id="{544FCF9B-4D64-E146-AC3C-205DEAA733C4}" type="datetimeFigureOut">
               <a:rPr lang="en-US" smtClean="0"/>
-              <a:t>9/8/15</a:t>
+              <a:t>9/10/15</a:t>
             </a:fld>
             <a:endParaRPr lang="en-US"/>
           </a:p>
@@ -2335,7 +2335,7 @@
           <a:p>
             <a:fld id="{544FCF9B-4D64-E146-AC3C-205DEAA733C4}" type="datetimeFigureOut">
               <a:rPr lang="en-US" smtClean="0"/>
-              <a:t>9/8/15</a:t>
+              <a:t>9/10/15</a:t>
             </a:fld>
             <a:endParaRPr lang="en-US"/>
           </a:p>
@@ -2430,7 +2430,7 @@
           <a:p>
             <a:fld id="{544FCF9B-4D64-E146-AC3C-205DEAA733C4}" type="datetimeFigureOut">
               <a:rPr lang="en-US" smtClean="0"/>
-              <a:t>9/8/15</a:t>
+              <a:t>9/10/15</a:t>
             </a:fld>
             <a:endParaRPr lang="en-US"/>
           </a:p>
@@ -2707,7 +2707,7 @@
           <a:p>
             <a:fld id="{544FCF9B-4D64-E146-AC3C-205DEAA733C4}" type="datetimeFigureOut">
               <a:rPr lang="en-US" smtClean="0"/>
-              <a:t>9/8/15</a:t>
+              <a:t>9/10/15</a:t>
             </a:fld>
             <a:endParaRPr lang="en-US"/>
           </a:p>
@@ -2960,7 +2960,7 @@
           <a:p>
             <a:fld id="{544FCF9B-4D64-E146-AC3C-205DEAA733C4}" type="datetimeFigureOut">
               <a:rPr lang="en-US" smtClean="0"/>
-              <a:t>9/8/15</a:t>
+              <a:t>9/10/15</a:t>
             </a:fld>
             <a:endParaRPr lang="en-US"/>
           </a:p>
@@ -3173,7 +3173,7 @@
           <a:p>
             <a:fld id="{544FCF9B-4D64-E146-AC3C-205DEAA733C4}" type="datetimeFigureOut">
               <a:rPr lang="en-US" smtClean="0"/>
-              <a:t>9/8/15</a:t>
+              <a:t>9/10/15</a:t>
             </a:fld>
             <a:endParaRPr lang="en-US"/>
           </a:p>
@@ -5102,77 +5102,37 @@
           </a:p>
         </p:txBody>
       </p:sp>
-      <p:sp>
-        <p:nvSpPr>
-          <p:cNvPr id="57" name="TextBox 56"/>
-          <p:cNvSpPr txBox="1"/>
-          <p:nvPr/>
-        </p:nvSpPr>
-        <p:spPr>
-          <a:xfrm>
-            <a:off x="6664577" y="475136"/>
-            <a:ext cx="1612196" cy="430887"/>
-          </a:xfrm>
-          <a:prstGeom prst="rect">
-            <a:avLst/>
-          </a:prstGeom>
-          <a:noFill/>
-          <a:ln>
-            <a:noFill/>
-          </a:ln>
-        </p:spPr>
-        <p:txBody>
-          <a:bodyPr wrap="square" rtlCol="0">
-            <a:spAutoFit/>
-          </a:bodyPr>
-          <a:lstStyle/>
-          <a:p>
-            <a:pPr algn="ctr"/>
-            <a:r>
-              <a:rPr lang="en-US" sz="1100" smtClean="0"/>
-              <a:t>Semantic Enricher (RUBIX)</a:t>
-            </a:r>
-            <a:endParaRPr lang="en-US" sz="1100" dirty="0"/>
-          </a:p>
-        </p:txBody>
-      </p:sp>
       <p:grpSp>
         <p:nvGrpSpPr>
-          <p:cNvPr id="6" name="Group 5"/>
+          <p:cNvPr id="18" name="Group 17"/>
           <p:cNvGrpSpPr/>
           <p:nvPr/>
         </p:nvGrpSpPr>
         <p:grpSpPr>
           <a:xfrm>
-            <a:off x="6805621" y="1508193"/>
-            <a:ext cx="1392448" cy="507830"/>
-            <a:chOff x="6684298" y="2682333"/>
-            <a:chExt cx="1639673" cy="412366"/>
+            <a:off x="6664577" y="475136"/>
+            <a:ext cx="1638597" cy="1744004"/>
+            <a:chOff x="6664577" y="475136"/>
+            <a:chExt cx="1638597" cy="1744004"/>
           </a:xfrm>
         </p:grpSpPr>
         <p:sp>
           <p:nvSpPr>
-            <p:cNvPr id="71" name="TextBox 70"/>
+            <p:cNvPr id="57" name="TextBox 56"/>
             <p:cNvSpPr txBox="1"/>
             <p:nvPr/>
           </p:nvSpPr>
           <p:spPr>
             <a:xfrm>
-              <a:off x="6684298" y="2682333"/>
-              <a:ext cx="1639673" cy="412366"/>
+              <a:off x="6664577" y="475136"/>
+              <a:ext cx="1612196" cy="430887"/>
             </a:xfrm>
             <a:prstGeom prst="rect">
               <a:avLst/>
             </a:prstGeom>
-            <a:solidFill>
-              <a:srgbClr val="FFC000">
-                <a:alpha val="21961"/>
-              </a:srgbClr>
-            </a:solidFill>
+            <a:noFill/>
             <a:ln>
-              <a:solidFill>
-                <a:schemeClr val="tx1"/>
-              </a:solidFill>
+              <a:noFill/>
             </a:ln>
           </p:spPr>
           <p:txBody>
@@ -5183,43 +5143,177 @@
             <a:p>
               <a:pPr algn="ctr"/>
               <a:r>
-                <a:rPr lang="en-US" sz="900" dirty="0" smtClean="0"/>
-                <a:t>SAP HANA</a:t>
+                <a:rPr lang="en-US" sz="1100" smtClean="0"/>
+                <a:t>Semantic Enricher (RUBIX)</a:t>
               </a:r>
+              <a:endParaRPr lang="en-US" sz="1100" dirty="0"/>
             </a:p>
+          </p:txBody>
+        </p:sp>
+        <p:grpSp>
+          <p:nvGrpSpPr>
+            <p:cNvPr id="6" name="Group 5"/>
+            <p:cNvGrpSpPr/>
+            <p:nvPr/>
+          </p:nvGrpSpPr>
+          <p:grpSpPr>
+            <a:xfrm>
+              <a:off x="6805621" y="1508193"/>
+              <a:ext cx="1392448" cy="507830"/>
+              <a:chOff x="6684298" y="2682333"/>
+              <a:chExt cx="1639673" cy="412366"/>
+            </a:xfrm>
+          </p:grpSpPr>
+          <p:sp>
+            <p:nvSpPr>
+              <p:cNvPr id="71" name="TextBox 70"/>
+              <p:cNvSpPr txBox="1"/>
+              <p:nvPr/>
+            </p:nvSpPr>
+            <p:spPr>
+              <a:xfrm>
+                <a:off x="6684298" y="2682333"/>
+                <a:ext cx="1639673" cy="412366"/>
+              </a:xfrm>
+              <a:prstGeom prst="rect">
+                <a:avLst/>
+              </a:prstGeom>
+              <a:solidFill>
+                <a:srgbClr val="FFC000">
+                  <a:alpha val="21961"/>
+                </a:srgbClr>
+              </a:solidFill>
+              <a:ln>
+                <a:solidFill>
+                  <a:schemeClr val="tx1"/>
+                </a:solidFill>
+              </a:ln>
+            </p:spPr>
+            <p:txBody>
+              <a:bodyPr wrap="square" rtlCol="0">
+                <a:spAutoFit/>
+              </a:bodyPr>
+              <a:lstStyle/>
+              <a:p>
+                <a:pPr algn="ctr"/>
+                <a:r>
+                  <a:rPr lang="en-US" sz="900" dirty="0" smtClean="0"/>
+                  <a:t>SAP HANA</a:t>
+                </a:r>
+              </a:p>
+              <a:p>
+                <a:pPr algn="ctr"/>
+                <a:endParaRPr lang="en-US" sz="900" dirty="0"/>
+              </a:p>
+              <a:p>
+                <a:pPr algn="ctr"/>
+                <a:endParaRPr lang="en-US" sz="900" dirty="0"/>
+              </a:p>
+            </p:txBody>
+          </p:sp>
+          <p:sp>
+            <p:nvSpPr>
+              <p:cNvPr id="76" name="TextBox 75"/>
+              <p:cNvSpPr txBox="1"/>
+              <p:nvPr/>
+            </p:nvSpPr>
+            <p:spPr>
+              <a:xfrm>
+                <a:off x="7042906" y="2870006"/>
+                <a:ext cx="912239" cy="162448"/>
+              </a:xfrm>
+              <a:prstGeom prst="rect">
+                <a:avLst/>
+              </a:prstGeom>
+              <a:solidFill>
+                <a:srgbClr val="FFC000">
+                  <a:alpha val="21961"/>
+                </a:srgbClr>
+              </a:solidFill>
+              <a:ln>
+                <a:solidFill>
+                  <a:schemeClr val="tx1"/>
+                </a:solidFill>
+              </a:ln>
+            </p:spPr>
+            <p:txBody>
+              <a:bodyPr wrap="square" rtlCol="0">
+                <a:spAutoFit/>
+              </a:bodyPr>
+              <a:lstStyle/>
+              <a:p>
+                <a:pPr algn="ctr"/>
+                <a:r>
+                  <a:rPr lang="en-US" sz="700" dirty="0" smtClean="0"/>
+                  <a:t>DBpedia</a:t>
+                </a:r>
+                <a:endParaRPr lang="en-US" sz="900" dirty="0"/>
+              </a:p>
+            </p:txBody>
+          </p:sp>
+        </p:grpSp>
+        <p:sp>
+          <p:nvSpPr>
+            <p:cNvPr id="77" name="Rectangle 76"/>
+            <p:cNvSpPr/>
+            <p:nvPr/>
+          </p:nvSpPr>
+          <p:spPr>
+            <a:xfrm>
+              <a:off x="6721157" y="894915"/>
+              <a:ext cx="1582017" cy="1324225"/>
+            </a:xfrm>
+            <a:prstGeom prst="rect">
+              <a:avLst/>
+            </a:prstGeom>
+            <a:noFill/>
+            <a:ln>
+              <a:solidFill>
+                <a:schemeClr val="tx1"/>
+              </a:solidFill>
+            </a:ln>
+            <a:effectLst/>
+          </p:spPr>
+          <p:style>
+            <a:lnRef idx="1">
+              <a:schemeClr val="accent1"/>
+            </a:lnRef>
+            <a:fillRef idx="3">
+              <a:schemeClr val="accent1"/>
+            </a:fillRef>
+            <a:effectRef idx="2">
+              <a:schemeClr val="accent1"/>
+            </a:effectRef>
+            <a:fontRef idx="minor">
+              <a:schemeClr val="lt1"/>
+            </a:fontRef>
+          </p:style>
+          <p:txBody>
+            <a:bodyPr rtlCol="0" anchor="ctr"/>
+            <a:lstStyle/>
             <a:p>
               <a:pPr algn="ctr"/>
-              <a:endParaRPr lang="en-US" sz="900" dirty="0"/>
-            </a:p>
-            <a:p>
-              <a:pPr algn="ctr"/>
-              <a:endParaRPr lang="en-US" sz="900" dirty="0"/>
+              <a:endParaRPr lang="en-US"/>
             </a:p>
           </p:txBody>
         </p:sp>
         <p:sp>
           <p:nvSpPr>
-            <p:cNvPr id="76" name="TextBox 75"/>
+            <p:cNvPr id="81" name="TextBox 80"/>
             <p:cNvSpPr txBox="1"/>
             <p:nvPr/>
           </p:nvSpPr>
           <p:spPr>
             <a:xfrm>
-              <a:off x="7042906" y="2870006"/>
-              <a:ext cx="912239" cy="162448"/>
+              <a:off x="6695276" y="977331"/>
+              <a:ext cx="1581497" cy="430887"/>
             </a:xfrm>
             <a:prstGeom prst="rect">
               <a:avLst/>
             </a:prstGeom>
-            <a:solidFill>
-              <a:srgbClr val="FFC000">
-                <a:alpha val="21961"/>
-              </a:srgbClr>
-            </a:solidFill>
+            <a:noFill/>
             <a:ln>
-              <a:solidFill>
-                <a:schemeClr val="tx1"/>
-              </a:solidFill>
+              <a:noFill/>
             </a:ln>
           </p:spPr>
           <p:txBody>
@@ -5230,172 +5324,14 @@
             <a:p>
               <a:pPr algn="ctr"/>
               <a:r>
-                <a:rPr lang="en-US" sz="700" dirty="0" smtClean="0"/>
-                <a:t>DBpedia</a:t>
+                <a:rPr lang="en-US" sz="1100" dirty="0" smtClean="0"/>
+                <a:t>Entity Disambiguation API</a:t>
               </a:r>
-              <a:endParaRPr lang="en-US" sz="900" dirty="0"/>
+              <a:endParaRPr lang="en-US" sz="1100" dirty="0"/>
             </a:p>
           </p:txBody>
         </p:sp>
       </p:grpSp>
-      <p:sp>
-        <p:nvSpPr>
-          <p:cNvPr id="77" name="Rectangle 76"/>
-          <p:cNvSpPr/>
-          <p:nvPr/>
-        </p:nvSpPr>
-        <p:spPr>
-          <a:xfrm>
-            <a:off x="6721157" y="894915"/>
-            <a:ext cx="1582017" cy="1324225"/>
-          </a:xfrm>
-          <a:prstGeom prst="rect">
-            <a:avLst/>
-          </a:prstGeom>
-          <a:noFill/>
-          <a:ln>
-            <a:solidFill>
-              <a:schemeClr val="tx1"/>
-            </a:solidFill>
-          </a:ln>
-          <a:effectLst/>
-        </p:spPr>
-        <p:style>
-          <a:lnRef idx="1">
-            <a:schemeClr val="accent1"/>
-          </a:lnRef>
-          <a:fillRef idx="3">
-            <a:schemeClr val="accent1"/>
-          </a:fillRef>
-          <a:effectRef idx="2">
-            <a:schemeClr val="accent1"/>
-          </a:effectRef>
-          <a:fontRef idx="minor">
-            <a:schemeClr val="lt1"/>
-          </a:fontRef>
-        </p:style>
-        <p:txBody>
-          <a:bodyPr rtlCol="0" anchor="ctr"/>
-          <a:lstStyle/>
-          <a:p>
-            <a:pPr algn="ctr"/>
-            <a:endParaRPr lang="en-US"/>
-          </a:p>
-        </p:txBody>
-      </p:sp>
-      <p:sp>
-        <p:nvSpPr>
-          <p:cNvPr id="80" name="Rectangle 79"/>
-          <p:cNvSpPr/>
-          <p:nvPr/>
-        </p:nvSpPr>
-        <p:spPr>
-          <a:xfrm>
-            <a:off x="6715838" y="2504527"/>
-            <a:ext cx="1582017" cy="608064"/>
-          </a:xfrm>
-          <a:prstGeom prst="rect">
-            <a:avLst/>
-          </a:prstGeom>
-          <a:noFill/>
-          <a:ln>
-            <a:solidFill>
-              <a:schemeClr val="tx1"/>
-            </a:solidFill>
-          </a:ln>
-          <a:effectLst/>
-        </p:spPr>
-        <p:style>
-          <a:lnRef idx="1">
-            <a:schemeClr val="accent1"/>
-          </a:lnRef>
-          <a:fillRef idx="3">
-            <a:schemeClr val="accent1"/>
-          </a:fillRef>
-          <a:effectRef idx="2">
-            <a:schemeClr val="accent1"/>
-          </a:effectRef>
-          <a:fontRef idx="minor">
-            <a:schemeClr val="lt1"/>
-          </a:fontRef>
-        </p:style>
-        <p:txBody>
-          <a:bodyPr rtlCol="0" anchor="ctr"/>
-          <a:lstStyle/>
-          <a:p>
-            <a:pPr algn="ctr"/>
-            <a:endParaRPr lang="en-US"/>
-          </a:p>
-        </p:txBody>
-      </p:sp>
-      <p:sp>
-        <p:nvSpPr>
-          <p:cNvPr id="81" name="TextBox 80"/>
-          <p:cNvSpPr txBox="1"/>
-          <p:nvPr/>
-        </p:nvSpPr>
-        <p:spPr>
-          <a:xfrm>
-            <a:off x="6695276" y="977331"/>
-            <a:ext cx="1581497" cy="430887"/>
-          </a:xfrm>
-          <a:prstGeom prst="rect">
-            <a:avLst/>
-          </a:prstGeom>
-          <a:noFill/>
-          <a:ln>
-            <a:noFill/>
-          </a:ln>
-        </p:spPr>
-        <p:txBody>
-          <a:bodyPr wrap="square" rtlCol="0">
-            <a:spAutoFit/>
-          </a:bodyPr>
-          <a:lstStyle/>
-          <a:p>
-            <a:pPr algn="ctr"/>
-            <a:r>
-              <a:rPr lang="en-US" sz="1100" dirty="0" smtClean="0"/>
-              <a:t>Contextual Entity Recognizer</a:t>
-            </a:r>
-            <a:endParaRPr lang="en-US" sz="1100" dirty="0"/>
-          </a:p>
-        </p:txBody>
-      </p:sp>
-      <p:sp>
-        <p:nvSpPr>
-          <p:cNvPr id="82" name="TextBox 81"/>
-          <p:cNvSpPr txBox="1"/>
-          <p:nvPr/>
-        </p:nvSpPr>
-        <p:spPr>
-          <a:xfrm>
-            <a:off x="7052171" y="2585143"/>
-            <a:ext cx="788226" cy="430887"/>
-          </a:xfrm>
-          <a:prstGeom prst="rect">
-            <a:avLst/>
-          </a:prstGeom>
-          <a:noFill/>
-          <a:ln>
-            <a:noFill/>
-          </a:ln>
-        </p:spPr>
-        <p:txBody>
-          <a:bodyPr wrap="square" rtlCol="0">
-            <a:spAutoFit/>
-          </a:bodyPr>
-          <a:lstStyle/>
-          <a:p>
-            <a:pPr algn="ctr"/>
-            <a:r>
-              <a:rPr lang="en-US" sz="1100" dirty="0" smtClean="0"/>
-              <a:t>Quality Profiler</a:t>
-            </a:r>
-            <a:endParaRPr lang="en-US" sz="1100" dirty="0"/>
-          </a:p>
-        </p:txBody>
-      </p:sp>
       <p:grpSp>
         <p:nvGrpSpPr>
           <p:cNvPr id="16" name="Group 15"/>
@@ -6547,567 +6483,6 @@
           </p:txBody>
         </p:sp>
       </p:grpSp>
-      <p:sp>
-        <p:nvSpPr>
-          <p:cNvPr id="2" name="Rectangle 1"/>
-          <p:cNvSpPr/>
-          <p:nvPr/>
-        </p:nvSpPr>
-        <p:spPr>
-          <a:xfrm>
-            <a:off x="290945" y="240847"/>
-            <a:ext cx="6203109" cy="3167371"/>
-          </a:xfrm>
-          <a:prstGeom prst="rect">
-            <a:avLst/>
-          </a:prstGeom>
-          <a:noFill/>
-          <a:ln w="6350">
-            <a:prstDash val="sysDash"/>
-          </a:ln>
-        </p:spPr>
-        <p:style>
-          <a:lnRef idx="2">
-            <a:schemeClr val="dk1"/>
-          </a:lnRef>
-          <a:fillRef idx="1">
-            <a:schemeClr val="lt1"/>
-          </a:fillRef>
-          <a:effectRef idx="0">
-            <a:schemeClr val="dk1"/>
-          </a:effectRef>
-          <a:fontRef idx="minor">
-            <a:schemeClr val="dk1"/>
-          </a:fontRef>
-        </p:style>
-        <p:txBody>
-          <a:bodyPr rtlCol="0" anchor="ctr"/>
-          <a:lstStyle/>
-          <a:p>
-            <a:pPr algn="ctr"/>
-            <a:endParaRPr lang="en-US"/>
-          </a:p>
-        </p:txBody>
-      </p:sp>
-      <p:sp>
-        <p:nvSpPr>
-          <p:cNvPr id="88" name="TextBox 87"/>
-          <p:cNvSpPr txBox="1"/>
-          <p:nvPr/>
-        </p:nvSpPr>
-        <p:spPr>
-          <a:xfrm>
-            <a:off x="-61681" y="221354"/>
-            <a:ext cx="1612196" cy="261610"/>
-          </a:xfrm>
-          <a:prstGeom prst="rect">
-            <a:avLst/>
-          </a:prstGeom>
-          <a:noFill/>
-          <a:ln>
-            <a:noFill/>
-          </a:ln>
-        </p:spPr>
-        <p:txBody>
-          <a:bodyPr wrap="square" rtlCol="0">
-            <a:spAutoFit/>
-          </a:bodyPr>
-          <a:lstStyle/>
-          <a:p>
-            <a:pPr algn="ctr"/>
-            <a:r>
-              <a:rPr lang="en-US" sz="1100" smtClean="0"/>
-              <a:t>Roomba</a:t>
-            </a:r>
-            <a:endParaRPr lang="en-US" sz="1100" dirty="0"/>
-          </a:p>
-        </p:txBody>
-      </p:sp>
-      <p:grpSp>
-        <p:nvGrpSpPr>
-          <p:cNvPr id="13" name="Group 12"/>
-          <p:cNvGrpSpPr/>
-          <p:nvPr/>
-        </p:nvGrpSpPr>
-        <p:grpSpPr>
-          <a:xfrm>
-            <a:off x="271275" y="218545"/>
-            <a:ext cx="227096" cy="264653"/>
-            <a:chOff x="-776977" y="923541"/>
-            <a:chExt cx="244748" cy="276999"/>
-          </a:xfrm>
-        </p:grpSpPr>
-        <p:sp>
-          <p:nvSpPr>
-            <p:cNvPr id="11" name="Rectangle 10"/>
-            <p:cNvSpPr/>
-            <p:nvPr/>
-          </p:nvSpPr>
-          <p:spPr>
-            <a:xfrm>
-              <a:off x="-732373" y="977331"/>
-              <a:ext cx="180827" cy="165574"/>
-            </a:xfrm>
-            <a:prstGeom prst="rect">
-              <a:avLst/>
-            </a:prstGeom>
-            <a:solidFill>
-              <a:schemeClr val="tx1"/>
-            </a:solidFill>
-            <a:ln>
-              <a:noFill/>
-            </a:ln>
-            <a:effectLst/>
-          </p:spPr>
-          <p:style>
-            <a:lnRef idx="1">
-              <a:schemeClr val="accent1"/>
-            </a:lnRef>
-            <a:fillRef idx="3">
-              <a:schemeClr val="accent1"/>
-            </a:fillRef>
-            <a:effectRef idx="2">
-              <a:schemeClr val="accent1"/>
-            </a:effectRef>
-            <a:fontRef idx="minor">
-              <a:schemeClr val="lt1"/>
-            </a:fontRef>
-          </p:style>
-          <p:txBody>
-            <a:bodyPr rtlCol="0" anchor="ctr"/>
-            <a:lstStyle/>
-            <a:p>
-              <a:pPr algn="ctr"/>
-              <a:endParaRPr lang="en-US"/>
-            </a:p>
-          </p:txBody>
-        </p:sp>
-        <p:sp>
-          <p:nvSpPr>
-            <p:cNvPr id="4" name="TextBox 3"/>
-            <p:cNvSpPr txBox="1"/>
-            <p:nvPr/>
-          </p:nvSpPr>
-          <p:spPr>
-            <a:xfrm>
-              <a:off x="-776977" y="923541"/>
-              <a:ext cx="244748" cy="276999"/>
-            </a:xfrm>
-            <a:prstGeom prst="rect">
-              <a:avLst/>
-            </a:prstGeom>
-            <a:noFill/>
-          </p:spPr>
-          <p:txBody>
-            <a:bodyPr wrap="square" rtlCol="0">
-              <a:spAutoFit/>
-            </a:bodyPr>
-            <a:lstStyle/>
-            <a:p>
-              <a:r>
-                <a:rPr lang="en-US" sz="1200" dirty="0" smtClean="0">
-                  <a:solidFill>
-                    <a:schemeClr val="bg1"/>
-                  </a:solidFill>
-                </a:rPr>
-                <a:t>A</a:t>
-              </a:r>
-              <a:endParaRPr lang="en-US" sz="1200" dirty="0">
-                <a:solidFill>
-                  <a:schemeClr val="bg1"/>
-                </a:solidFill>
-              </a:endParaRPr>
-            </a:p>
-          </p:txBody>
-        </p:sp>
-      </p:grpSp>
-      <p:grpSp>
-        <p:nvGrpSpPr>
-          <p:cNvPr id="90" name="Group 89"/>
-          <p:cNvGrpSpPr/>
-          <p:nvPr/>
-        </p:nvGrpSpPr>
-        <p:grpSpPr>
-          <a:xfrm>
-            <a:off x="384823" y="3547689"/>
-            <a:ext cx="227096" cy="276999"/>
-            <a:chOff x="-776977" y="923541"/>
-            <a:chExt cx="244748" cy="289921"/>
-          </a:xfrm>
-        </p:grpSpPr>
-        <p:sp>
-          <p:nvSpPr>
-            <p:cNvPr id="91" name="Rectangle 90"/>
-            <p:cNvSpPr/>
-            <p:nvPr/>
-          </p:nvSpPr>
-          <p:spPr>
-            <a:xfrm>
-              <a:off x="-732373" y="977331"/>
-              <a:ext cx="180827" cy="165574"/>
-            </a:xfrm>
-            <a:prstGeom prst="rect">
-              <a:avLst/>
-            </a:prstGeom>
-            <a:solidFill>
-              <a:schemeClr val="tx1"/>
-            </a:solidFill>
-            <a:ln>
-              <a:noFill/>
-            </a:ln>
-            <a:effectLst/>
-          </p:spPr>
-          <p:style>
-            <a:lnRef idx="1">
-              <a:schemeClr val="accent1"/>
-            </a:lnRef>
-            <a:fillRef idx="3">
-              <a:schemeClr val="accent1"/>
-            </a:fillRef>
-            <a:effectRef idx="2">
-              <a:schemeClr val="accent1"/>
-            </a:effectRef>
-            <a:fontRef idx="minor">
-              <a:schemeClr val="lt1"/>
-            </a:fontRef>
-          </p:style>
-          <p:txBody>
-            <a:bodyPr rtlCol="0" anchor="ctr"/>
-            <a:lstStyle/>
-            <a:p>
-              <a:pPr algn="ctr"/>
-              <a:endParaRPr lang="en-US"/>
-            </a:p>
-          </p:txBody>
-        </p:sp>
-        <p:sp>
-          <p:nvSpPr>
-            <p:cNvPr id="93" name="TextBox 92"/>
-            <p:cNvSpPr txBox="1"/>
-            <p:nvPr/>
-          </p:nvSpPr>
-          <p:spPr>
-            <a:xfrm>
-              <a:off x="-776977" y="923541"/>
-              <a:ext cx="244748" cy="289921"/>
-            </a:xfrm>
-            <a:prstGeom prst="rect">
-              <a:avLst/>
-            </a:prstGeom>
-            <a:noFill/>
-          </p:spPr>
-          <p:txBody>
-            <a:bodyPr wrap="square" rtlCol="0">
-              <a:spAutoFit/>
-            </a:bodyPr>
-            <a:lstStyle/>
-            <a:p>
-              <a:r>
-                <a:rPr lang="en-US" sz="1200" dirty="0">
-                  <a:solidFill>
-                    <a:schemeClr val="bg1"/>
-                  </a:solidFill>
-                </a:rPr>
-                <a:t>B</a:t>
-              </a:r>
-            </a:p>
-          </p:txBody>
-        </p:sp>
-      </p:grpSp>
-      <p:grpSp>
-        <p:nvGrpSpPr>
-          <p:cNvPr id="94" name="Group 93"/>
-          <p:cNvGrpSpPr/>
-          <p:nvPr/>
-        </p:nvGrpSpPr>
-        <p:grpSpPr>
-          <a:xfrm>
-            <a:off x="2368557" y="2094886"/>
-            <a:ext cx="227096" cy="276999"/>
-            <a:chOff x="-776977" y="923541"/>
-            <a:chExt cx="244748" cy="289921"/>
-          </a:xfrm>
-        </p:grpSpPr>
-        <p:sp>
-          <p:nvSpPr>
-            <p:cNvPr id="95" name="Rectangle 94"/>
-            <p:cNvSpPr/>
-            <p:nvPr/>
-          </p:nvSpPr>
-          <p:spPr>
-            <a:xfrm>
-              <a:off x="-732373" y="977331"/>
-              <a:ext cx="180827" cy="165574"/>
-            </a:xfrm>
-            <a:prstGeom prst="rect">
-              <a:avLst/>
-            </a:prstGeom>
-            <a:solidFill>
-              <a:schemeClr val="tx1"/>
-            </a:solidFill>
-            <a:ln>
-              <a:noFill/>
-            </a:ln>
-            <a:effectLst/>
-          </p:spPr>
-          <p:style>
-            <a:lnRef idx="1">
-              <a:schemeClr val="accent1"/>
-            </a:lnRef>
-            <a:fillRef idx="3">
-              <a:schemeClr val="accent1"/>
-            </a:fillRef>
-            <a:effectRef idx="2">
-              <a:schemeClr val="accent1"/>
-            </a:effectRef>
-            <a:fontRef idx="minor">
-              <a:schemeClr val="lt1"/>
-            </a:fontRef>
-          </p:style>
-          <p:txBody>
-            <a:bodyPr rtlCol="0" anchor="ctr"/>
-            <a:lstStyle/>
-            <a:p>
-              <a:pPr algn="ctr"/>
-              <a:endParaRPr lang="en-US"/>
-            </a:p>
-          </p:txBody>
-        </p:sp>
-        <p:sp>
-          <p:nvSpPr>
-            <p:cNvPr id="96" name="TextBox 95"/>
-            <p:cNvSpPr txBox="1"/>
-            <p:nvPr/>
-          </p:nvSpPr>
-          <p:spPr>
-            <a:xfrm>
-              <a:off x="-776977" y="923541"/>
-              <a:ext cx="244748" cy="289921"/>
-            </a:xfrm>
-            <a:prstGeom prst="rect">
-              <a:avLst/>
-            </a:prstGeom>
-            <a:noFill/>
-          </p:spPr>
-          <p:txBody>
-            <a:bodyPr wrap="square" rtlCol="0">
-              <a:spAutoFit/>
-            </a:bodyPr>
-            <a:lstStyle/>
-            <a:p>
-              <a:r>
-                <a:rPr lang="en-US" sz="1200" dirty="0">
-                  <a:solidFill>
-                    <a:schemeClr val="bg1"/>
-                  </a:solidFill>
-                </a:rPr>
-                <a:t>C</a:t>
-              </a:r>
-              <a:endParaRPr lang="en-US" sz="1200" dirty="0">
-                <a:solidFill>
-                  <a:schemeClr val="bg1"/>
-                </a:solidFill>
-              </a:endParaRPr>
-            </a:p>
-          </p:txBody>
-        </p:sp>
-      </p:grpSp>
-      <p:grpSp>
-        <p:nvGrpSpPr>
-          <p:cNvPr id="97" name="Group 96"/>
-          <p:cNvGrpSpPr/>
-          <p:nvPr/>
-        </p:nvGrpSpPr>
-        <p:grpSpPr>
-          <a:xfrm>
-            <a:off x="6569341" y="453950"/>
-            <a:ext cx="227096" cy="276999"/>
-            <a:chOff x="-776977" y="923541"/>
-            <a:chExt cx="244748" cy="289921"/>
-          </a:xfrm>
-        </p:grpSpPr>
-        <p:sp>
-          <p:nvSpPr>
-            <p:cNvPr id="98" name="Rectangle 97"/>
-            <p:cNvSpPr/>
-            <p:nvPr/>
-          </p:nvSpPr>
-          <p:spPr>
-            <a:xfrm>
-              <a:off x="-732373" y="977331"/>
-              <a:ext cx="180827" cy="165574"/>
-            </a:xfrm>
-            <a:prstGeom prst="rect">
-              <a:avLst/>
-            </a:prstGeom>
-            <a:solidFill>
-              <a:schemeClr val="tx1"/>
-            </a:solidFill>
-            <a:ln>
-              <a:noFill/>
-            </a:ln>
-            <a:effectLst/>
-          </p:spPr>
-          <p:style>
-            <a:lnRef idx="1">
-              <a:schemeClr val="accent1"/>
-            </a:lnRef>
-            <a:fillRef idx="3">
-              <a:schemeClr val="accent1"/>
-            </a:fillRef>
-            <a:effectRef idx="2">
-              <a:schemeClr val="accent1"/>
-            </a:effectRef>
-            <a:fontRef idx="minor">
-              <a:schemeClr val="lt1"/>
-            </a:fontRef>
-          </p:style>
-          <p:txBody>
-            <a:bodyPr rtlCol="0" anchor="ctr"/>
-            <a:lstStyle/>
-            <a:p>
-              <a:pPr algn="ctr"/>
-              <a:endParaRPr lang="en-US"/>
-            </a:p>
-          </p:txBody>
-        </p:sp>
-        <p:sp>
-          <p:nvSpPr>
-            <p:cNvPr id="99" name="TextBox 98"/>
-            <p:cNvSpPr txBox="1"/>
-            <p:nvPr/>
-          </p:nvSpPr>
-          <p:spPr>
-            <a:xfrm>
-              <a:off x="-776977" y="923541"/>
-              <a:ext cx="244748" cy="289921"/>
-            </a:xfrm>
-            <a:prstGeom prst="rect">
-              <a:avLst/>
-            </a:prstGeom>
-            <a:noFill/>
-          </p:spPr>
-          <p:txBody>
-            <a:bodyPr wrap="square" rtlCol="0">
-              <a:spAutoFit/>
-            </a:bodyPr>
-            <a:lstStyle/>
-            <a:p>
-              <a:r>
-                <a:rPr lang="en-US" sz="1200" dirty="0">
-                  <a:solidFill>
-                    <a:schemeClr val="bg1"/>
-                  </a:solidFill>
-                </a:rPr>
-                <a:t>D</a:t>
-              </a:r>
-              <a:endParaRPr lang="en-US" sz="1200" dirty="0">
-                <a:solidFill>
-                  <a:schemeClr val="bg1"/>
-                </a:solidFill>
-              </a:endParaRPr>
-            </a:p>
-          </p:txBody>
-        </p:sp>
-      </p:grpSp>
-      <p:grpSp>
-        <p:nvGrpSpPr>
-          <p:cNvPr id="100" name="Group 99"/>
-          <p:cNvGrpSpPr/>
-          <p:nvPr/>
-        </p:nvGrpSpPr>
-        <p:grpSpPr>
-          <a:xfrm>
-            <a:off x="384823" y="3932665"/>
-            <a:ext cx="227096" cy="461665"/>
-            <a:chOff x="-776977" y="923541"/>
-            <a:chExt cx="244748" cy="483202"/>
-          </a:xfrm>
-        </p:grpSpPr>
-        <p:sp>
-          <p:nvSpPr>
-            <p:cNvPr id="101" name="Rectangle 100"/>
-            <p:cNvSpPr/>
-            <p:nvPr/>
-          </p:nvSpPr>
-          <p:spPr>
-            <a:xfrm>
-              <a:off x="-732373" y="977331"/>
-              <a:ext cx="180827" cy="165574"/>
-            </a:xfrm>
-            <a:prstGeom prst="rect">
-              <a:avLst/>
-            </a:prstGeom>
-            <a:solidFill>
-              <a:schemeClr val="tx1"/>
-            </a:solidFill>
-            <a:ln>
-              <a:noFill/>
-            </a:ln>
-            <a:effectLst/>
-          </p:spPr>
-          <p:style>
-            <a:lnRef idx="1">
-              <a:schemeClr val="accent1"/>
-            </a:lnRef>
-            <a:fillRef idx="3">
-              <a:schemeClr val="accent1"/>
-            </a:fillRef>
-            <a:effectRef idx="2">
-              <a:schemeClr val="accent1"/>
-            </a:effectRef>
-            <a:fontRef idx="minor">
-              <a:schemeClr val="lt1"/>
-            </a:fontRef>
-          </p:style>
-          <p:txBody>
-            <a:bodyPr rtlCol="0" anchor="ctr"/>
-            <a:lstStyle/>
-            <a:p>
-              <a:pPr algn="ctr"/>
-              <a:endParaRPr lang="en-US"/>
-            </a:p>
-          </p:txBody>
-        </p:sp>
-        <p:sp>
-          <p:nvSpPr>
-            <p:cNvPr id="102" name="TextBox 101"/>
-            <p:cNvSpPr txBox="1"/>
-            <p:nvPr/>
-          </p:nvSpPr>
-          <p:spPr>
-            <a:xfrm>
-              <a:off x="-776977" y="923541"/>
-              <a:ext cx="244748" cy="483202"/>
-            </a:xfrm>
-            <a:prstGeom prst="rect">
-              <a:avLst/>
-            </a:prstGeom>
-            <a:noFill/>
-          </p:spPr>
-          <p:txBody>
-            <a:bodyPr wrap="square" rtlCol="0">
-              <a:spAutoFit/>
-            </a:bodyPr>
-            <a:lstStyle/>
-            <a:p>
-              <a:r>
-                <a:rPr lang="en-US" sz="1200" dirty="0" smtClean="0">
-                  <a:solidFill>
-                    <a:schemeClr val="bg1"/>
-                  </a:solidFill>
-                </a:rPr>
-                <a:t>EA</a:t>
-              </a:r>
-              <a:endParaRPr lang="en-US" sz="1200" dirty="0">
-                <a:solidFill>
-                  <a:schemeClr val="bg1"/>
-                </a:solidFill>
-              </a:endParaRPr>
-            </a:p>
-          </p:txBody>
-        </p:sp>
-      </p:grpSp>
     </p:spTree>
     <p:extLst>
       <p:ext uri="{BB962C8B-B14F-4D97-AF65-F5344CB8AC3E}">

</xml_diff>